<commit_message>
Update DVCS lecture and add lecture notes.
</commit_message>
<xml_diff>
--- a/Lectures/Introduction to Distributed Version Control/Introduction to Distributed Version Control.pptx
+++ b/Lectures/Introduction to Distributed Version Control/Introduction to Distributed Version Control.pptx
@@ -211,7 +211,7 @@
           <a:p>
             <a:fld id="{DBE0ECA1-3FBF-48AE-AD2A-4439AE745E19}" type="datetimeFigureOut">
               <a:rPr lang="en-US" smtClean="0"/>
-              <a:t>10/17/2013</a:t>
+              <a:t>1/17/2014</a:t>
             </a:fld>
             <a:endParaRPr lang="en-US"/>
           </a:p>
@@ -672,7 +672,7 @@
           <a:p>
             <a:fld id="{9769DED8-28D4-45B9-A00F-7CFE9335FEA6}" type="datetime1">
               <a:rPr lang="en-US" smtClean="0"/>
-              <a:t>10/17/2013</a:t>
+              <a:t>1/17/2014</a:t>
             </a:fld>
             <a:endParaRPr lang="en-US"/>
           </a:p>
@@ -937,7 +937,7 @@
           <a:p>
             <a:fld id="{2DB3D439-1F88-44B4-B5F7-F9BCD4064257}" type="datetime1">
               <a:rPr lang="en-US" smtClean="0"/>
-              <a:t>10/17/2013</a:t>
+              <a:t>1/17/2014</a:t>
             </a:fld>
             <a:endParaRPr lang="en-US"/>
           </a:p>
@@ -1112,7 +1112,7 @@
           <a:p>
             <a:fld id="{99C5638F-6F55-4055-935C-67841BE78C36}" type="datetime1">
               <a:rPr lang="en-US" smtClean="0"/>
-              <a:t>10/17/2013</a:t>
+              <a:t>1/17/2014</a:t>
             </a:fld>
             <a:endParaRPr lang="en-US"/>
           </a:p>
@@ -1277,7 +1277,7 @@
           <a:p>
             <a:fld id="{E6987D90-0C92-4B22-A29D-FED15412CED2}" type="datetime1">
               <a:rPr lang="en-US" smtClean="0"/>
-              <a:t>10/17/2013</a:t>
+              <a:t>1/17/2014</a:t>
             </a:fld>
             <a:endParaRPr lang="en-US"/>
           </a:p>
@@ -1526,7 +1526,7 @@
           <a:p>
             <a:fld id="{DDB67BC4-9554-49E0-BCB3-D1EF965BA0B8}" type="datetime1">
               <a:rPr lang="en-US" smtClean="0"/>
-              <a:t>10/17/2013</a:t>
+              <a:t>1/17/2014</a:t>
             </a:fld>
             <a:endParaRPr lang="en-US"/>
           </a:p>
@@ -1809,7 +1809,7 @@
           <a:p>
             <a:fld id="{EC24D770-803D-4E01-921C-9C100DD8230C}" type="datetime1">
               <a:rPr lang="en-US" smtClean="0"/>
-              <a:t>10/17/2013</a:t>
+              <a:t>1/17/2014</a:t>
             </a:fld>
             <a:endParaRPr lang="en-US"/>
           </a:p>
@@ -2248,7 +2248,7 @@
           <a:p>
             <a:fld id="{356AD44B-78A4-4209-8070-7DCBE2DC4992}" type="datetime1">
               <a:rPr lang="en-US" smtClean="0"/>
-              <a:t>10/17/2013</a:t>
+              <a:t>1/17/2014</a:t>
             </a:fld>
             <a:endParaRPr lang="en-US"/>
           </a:p>
@@ -2361,7 +2361,7 @@
           <a:p>
             <a:fld id="{A993C59A-7CA2-467F-B7F1-9096881A01B8}" type="datetime1">
               <a:rPr lang="en-US" smtClean="0"/>
-              <a:t>10/17/2013</a:t>
+              <a:t>1/17/2014</a:t>
             </a:fld>
             <a:endParaRPr lang="en-US"/>
           </a:p>
@@ -2451,7 +2451,7 @@
           <a:p>
             <a:fld id="{2B6B58D0-2488-434A-8ED1-692E09B85CC5}" type="datetime1">
               <a:rPr lang="en-US" smtClean="0"/>
-              <a:t>10/17/2013</a:t>
+              <a:t>1/17/2014</a:t>
             </a:fld>
             <a:endParaRPr lang="en-US"/>
           </a:p>
@@ -2693,7 +2693,7 @@
           <a:p>
             <a:fld id="{FDB0AFC2-7D64-4F61-A7B7-9932D3305DDA}" type="datetime1">
               <a:rPr lang="en-US" smtClean="0"/>
-              <a:t>10/17/2013</a:t>
+              <a:t>1/17/2014</a:t>
             </a:fld>
             <a:endParaRPr lang="en-US"/>
           </a:p>
@@ -2987,7 +2987,7 @@
           <a:p>
             <a:fld id="{4983D17A-D7B2-4ECE-8A2C-93679B9D177B}" type="datetime1">
               <a:rPr lang="en-US" smtClean="0"/>
-              <a:t>10/17/2013</a:t>
+              <a:t>1/17/2014</a:t>
             </a:fld>
             <a:endParaRPr lang="en-US"/>
           </a:p>
@@ -3281,7 +3281,7 @@
           <a:p>
             <a:fld id="{2A5275F7-419E-4C23-8A3D-2EE5742B2EC9}" type="datetime1">
               <a:rPr lang="en-US" smtClean="0"/>
-              <a:t>10/17/2013</a:t>
+              <a:t>1/17/2014</a:t>
             </a:fld>
             <a:endParaRPr lang="en-US"/>
           </a:p>
@@ -8222,7 +8222,26 @@
             <a:pPr marL="800100" lvl="1" indent="-342900"/>
             <a:r>
               <a:rPr lang="en-US" dirty="0" smtClean="0"/>
-              <a:t>Review changes that have been committed to the repo</a:t>
+              <a:t>See the differences between local files and the changed ones in the repository</a:t>
+            </a:r>
+          </a:p>
+          <a:p>
+            <a:pPr marL="800100" lvl="1" indent="-342900"/>
+            <a:endParaRPr lang="en-US" dirty="0"/>
+          </a:p>
+          <a:p>
+            <a:pPr marL="800100" lvl="1" indent="-342900"/>
+            <a:endParaRPr lang="en-US" dirty="0" smtClean="0"/>
+          </a:p>
+          <a:p>
+            <a:pPr marL="800100" lvl="1" indent="-342900"/>
+            <a:r>
+              <a:rPr lang="en-US" dirty="0" smtClean="0"/>
+              <a:t>Review </a:t>
+            </a:r>
+            <a:r>
+              <a:rPr lang="en-US" dirty="0" smtClean="0"/>
+              <a:t>changes that have been committed to the repo</a:t>
             </a:r>
             <a:endParaRPr lang="en-US" dirty="0"/>
           </a:p>
@@ -8315,7 +8334,7 @@
         </p:nvSpPr>
         <p:spPr>
           <a:xfrm>
-            <a:off x="1447800" y="4038600"/>
+            <a:off x="1447800" y="5486400"/>
             <a:ext cx="6477000" cy="381000"/>
           </a:xfrm>
           <a:prstGeom prst="rect">
@@ -8355,6 +8374,69 @@
                 <a:cs typeface="Courier New" panose="02070309020205020404" pitchFamily="49" charset="0"/>
               </a:rPr>
               <a:t> log</a:t>
+            </a:r>
+            <a:endParaRPr lang="en-US" dirty="0">
+              <a:latin typeface="Courier New" panose="02070309020205020404" pitchFamily="49" charset="0"/>
+              <a:cs typeface="Courier New" panose="02070309020205020404" pitchFamily="49" charset="0"/>
+            </a:endParaRPr>
+          </a:p>
+        </p:txBody>
+      </p:sp>
+      <p:sp>
+        <p:nvSpPr>
+          <p:cNvPr id="7" name="Rectangle 6"/>
+          <p:cNvSpPr/>
+          <p:nvPr/>
+        </p:nvSpPr>
+        <p:spPr>
+          <a:xfrm>
+            <a:off x="1447800" y="4419600"/>
+            <a:ext cx="6477000" cy="381000"/>
+          </a:xfrm>
+          <a:prstGeom prst="rect">
+            <a:avLst/>
+          </a:prstGeom>
+        </p:spPr>
+        <p:style>
+          <a:lnRef idx="2">
+            <a:schemeClr val="accent1">
+              <a:shade val="50000"/>
+            </a:schemeClr>
+          </a:lnRef>
+          <a:fillRef idx="1">
+            <a:schemeClr val="accent1"/>
+          </a:fillRef>
+          <a:effectRef idx="0">
+            <a:schemeClr val="accent1"/>
+          </a:effectRef>
+          <a:fontRef idx="minor">
+            <a:schemeClr val="lt1"/>
+          </a:fontRef>
+        </p:style>
+        <p:txBody>
+          <a:bodyPr rtlCol="0" anchor="ctr"/>
+          <a:lstStyle/>
+          <a:p>
+            <a:r>
+              <a:rPr lang="en-US" dirty="0" err="1" smtClean="0">
+                <a:latin typeface="Courier New" panose="02070309020205020404" pitchFamily="49" charset="0"/>
+                <a:cs typeface="Courier New" panose="02070309020205020404" pitchFamily="49" charset="0"/>
+              </a:rPr>
+              <a:t>git</a:t>
+            </a:r>
+            <a:r>
+              <a:rPr lang="en-US" dirty="0" smtClean="0">
+                <a:latin typeface="Courier New" panose="02070309020205020404" pitchFamily="49" charset="0"/>
+                <a:cs typeface="Courier New" panose="02070309020205020404" pitchFamily="49" charset="0"/>
+              </a:rPr>
+              <a:t> </a:t>
+            </a:r>
+            <a:r>
+              <a:rPr lang="en-US" dirty="0" smtClean="0">
+                <a:latin typeface="Courier New" panose="02070309020205020404" pitchFamily="49" charset="0"/>
+                <a:cs typeface="Courier New" panose="02070309020205020404" pitchFamily="49" charset="0"/>
+              </a:rPr>
+              <a:t>diff</a:t>
             </a:r>
             <a:endParaRPr lang="en-US" dirty="0">
               <a:latin typeface="Courier New" panose="02070309020205020404" pitchFamily="49" charset="0"/>
@@ -19098,14 +19180,7 @@
                 <a:latin typeface="Courier New" panose="02070309020205020404" pitchFamily="49" charset="0"/>
                 <a:cs typeface="Courier New" panose="02070309020205020404" pitchFamily="49" charset="0"/>
               </a:rPr>
-              <a:t>merge</a:t>
-            </a:r>
-            <a:r>
-              <a:rPr lang="en-US" dirty="0" smtClean="0">
-                <a:latin typeface="Courier New" panose="02070309020205020404" pitchFamily="49" charset="0"/>
-                <a:cs typeface="Courier New" panose="02070309020205020404" pitchFamily="49" charset="0"/>
-              </a:rPr>
-              <a:t> </a:t>
+              <a:t>merge </a:t>
             </a:r>
             <a:r>
               <a:rPr lang="en-US" dirty="0" err="1" smtClean="0">
@@ -24193,6 +24268,14 @@
               <a:rPr lang="en-US" dirty="0" err="1" smtClean="0"/>
               <a:t>Bitkeeper</a:t>
             </a:r>
+            <a:endParaRPr lang="en-US" dirty="0" smtClean="0"/>
+          </a:p>
+          <a:p>
+            <a:pPr marL="342900" indent="-342900"/>
+            <a:r>
+              <a:rPr lang="en-US" dirty="0" smtClean="0"/>
+              <a:t>Many others exist as well</a:t>
+            </a:r>
             <a:endParaRPr lang="en-US" dirty="0"/>
           </a:p>
         </p:txBody>

</xml_diff>